<commit_message>
Add information about topic_1 and topic_2
</commit_message>
<xml_diff>
--- a/assets/drawings.pptx
+++ b/assets/drawings.pptx
@@ -113,14 +113,6 @@
     </p:ext>
   </p:extLst>
 </p:presentation>
-</file>
-
-<file path=ppt/revisionInfo.xml><?xml version="1.0" encoding="utf-8"?>
-<p1510:revInfo xmlns:a="http://schemas.openxmlformats.org/drawingml/2006/main" xmlns:r="http://schemas.openxmlformats.org/officeDocument/2006/relationships" xmlns:p1510="http://schemas.microsoft.com/office/powerpoint/2015/10/main">
-  <p1510:revLst>
-    <p1510:client id="{F5C91CF1-42F3-4479-8BD4-0F30F72FB431}" v="20" dt="2024-07-11T18:05:06.395"/>
-  </p1510:revLst>
-</p1510:revInfo>
 </file>
 
 <file path=ppt/changesInfos/changesInfo1.xml><?xml version="1.0" encoding="utf-8"?>
@@ -450,6 +442,54 @@
       </pc:sldChg>
     </pc:docChg>
   </pc:docChgLst>
+  <pc:docChgLst>
+    <pc:chgData name="Philippe Baucour" userId="5102170ae7533958" providerId="LiveId" clId="{B136F75A-70D1-40B4-997E-2147F5B88A07}"/>
+    <pc:docChg chg="modSld">
+      <pc:chgData name="Philippe Baucour" userId="5102170ae7533958" providerId="LiveId" clId="{B136F75A-70D1-40B4-997E-2147F5B88A07}" dt="2024-10-30T07:20:36.828" v="13" actId="1076"/>
+      <pc:docMkLst>
+        <pc:docMk/>
+      </pc:docMkLst>
+      <pc:sldChg chg="modSp mod">
+        <pc:chgData name="Philippe Baucour" userId="5102170ae7533958" providerId="LiveId" clId="{B136F75A-70D1-40B4-997E-2147F5B88A07}" dt="2024-10-30T07:20:36.828" v="13" actId="1076"/>
+        <pc:sldMkLst>
+          <pc:docMk/>
+          <pc:sldMk cId="655326077" sldId="258"/>
+        </pc:sldMkLst>
+        <pc:spChg chg="mod">
+          <ac:chgData name="Philippe Baucour" userId="5102170ae7533958" providerId="LiveId" clId="{B136F75A-70D1-40B4-997E-2147F5B88A07}" dt="2024-10-30T07:20:36.828" v="13" actId="1076"/>
+          <ac:spMkLst>
+            <pc:docMk/>
+            <pc:sldMk cId="655326077" sldId="258"/>
+            <ac:spMk id="2" creationId="{A70C038D-8DA7-2F03-9DBF-2B87C07F478C}"/>
+          </ac:spMkLst>
+        </pc:spChg>
+        <pc:spChg chg="mod">
+          <ac:chgData name="Philippe Baucour" userId="5102170ae7533958" providerId="LiveId" clId="{B136F75A-70D1-40B4-997E-2147F5B88A07}" dt="2024-10-30T07:20:22.671" v="7" actId="1076"/>
+          <ac:spMkLst>
+            <pc:docMk/>
+            <pc:sldMk cId="655326077" sldId="258"/>
+            <ac:spMk id="3" creationId="{91BC0C1E-5907-59A0-BA02-D5D18020C7B2}"/>
+          </ac:spMkLst>
+        </pc:spChg>
+        <pc:spChg chg="mod">
+          <ac:chgData name="Philippe Baucour" userId="5102170ae7533958" providerId="LiveId" clId="{B136F75A-70D1-40B4-997E-2147F5B88A07}" dt="2024-10-30T07:20:08.342" v="6" actId="20577"/>
+          <ac:spMkLst>
+            <pc:docMk/>
+            <pc:sldMk cId="655326077" sldId="258"/>
+            <ac:spMk id="39" creationId="{AA657646-6134-7516-6765-A95D84029C18}"/>
+          </ac:spMkLst>
+        </pc:spChg>
+        <pc:spChg chg="mod">
+          <ac:chgData name="Philippe Baucour" userId="5102170ae7533958" providerId="LiveId" clId="{B136F75A-70D1-40B4-997E-2147F5B88A07}" dt="2024-10-30T07:20:30.927" v="12" actId="20577"/>
+          <ac:spMkLst>
+            <pc:docMk/>
+            <pc:sldMk cId="655326077" sldId="258"/>
+            <ac:spMk id="40" creationId="{6E18830C-A06B-2E59-3155-E21C8F882574}"/>
+          </ac:spMkLst>
+        </pc:spChg>
+      </pc:sldChg>
+    </pc:docChg>
+  </pc:docChgLst>
 </pc:chgInfo>
 </file>
 
@@ -600,7 +640,7 @@
           <a:p>
             <a:fld id="{48780376-FC85-460A-8725-EC72919AD33D}" type="datetimeFigureOut">
               <a:rPr lang="fr-FR" smtClean="0"/>
-              <a:t>11/07/2024</a:t>
+              <a:t>30/10/2024</a:t>
             </a:fld>
             <a:endParaRPr lang="fr-FR"/>
           </a:p>
@@ -798,7 +838,7 @@
           <a:p>
             <a:fld id="{48780376-FC85-460A-8725-EC72919AD33D}" type="datetimeFigureOut">
               <a:rPr lang="fr-FR" smtClean="0"/>
-              <a:t>11/07/2024</a:t>
+              <a:t>30/10/2024</a:t>
             </a:fld>
             <a:endParaRPr lang="fr-FR"/>
           </a:p>
@@ -1006,7 +1046,7 @@
           <a:p>
             <a:fld id="{48780376-FC85-460A-8725-EC72919AD33D}" type="datetimeFigureOut">
               <a:rPr lang="fr-FR" smtClean="0"/>
-              <a:t>11/07/2024</a:t>
+              <a:t>30/10/2024</a:t>
             </a:fld>
             <a:endParaRPr lang="fr-FR"/>
           </a:p>
@@ -1204,7 +1244,7 @@
           <a:p>
             <a:fld id="{48780376-FC85-460A-8725-EC72919AD33D}" type="datetimeFigureOut">
               <a:rPr lang="fr-FR" smtClean="0"/>
-              <a:t>11/07/2024</a:t>
+              <a:t>30/10/2024</a:t>
             </a:fld>
             <a:endParaRPr lang="fr-FR"/>
           </a:p>
@@ -1479,7 +1519,7 @@
           <a:p>
             <a:fld id="{48780376-FC85-460A-8725-EC72919AD33D}" type="datetimeFigureOut">
               <a:rPr lang="fr-FR" smtClean="0"/>
-              <a:t>11/07/2024</a:t>
+              <a:t>30/10/2024</a:t>
             </a:fld>
             <a:endParaRPr lang="fr-FR"/>
           </a:p>
@@ -1744,7 +1784,7 @@
           <a:p>
             <a:fld id="{48780376-FC85-460A-8725-EC72919AD33D}" type="datetimeFigureOut">
               <a:rPr lang="fr-FR" smtClean="0"/>
-              <a:t>11/07/2024</a:t>
+              <a:t>30/10/2024</a:t>
             </a:fld>
             <a:endParaRPr lang="fr-FR"/>
           </a:p>
@@ -2156,7 +2196,7 @@
           <a:p>
             <a:fld id="{48780376-FC85-460A-8725-EC72919AD33D}" type="datetimeFigureOut">
               <a:rPr lang="fr-FR" smtClean="0"/>
-              <a:t>11/07/2024</a:t>
+              <a:t>30/10/2024</a:t>
             </a:fld>
             <a:endParaRPr lang="fr-FR"/>
           </a:p>
@@ -2297,7 +2337,7 @@
           <a:p>
             <a:fld id="{48780376-FC85-460A-8725-EC72919AD33D}" type="datetimeFigureOut">
               <a:rPr lang="fr-FR" smtClean="0"/>
-              <a:t>11/07/2024</a:t>
+              <a:t>30/10/2024</a:t>
             </a:fld>
             <a:endParaRPr lang="fr-FR"/>
           </a:p>
@@ -2410,7 +2450,7 @@
           <a:p>
             <a:fld id="{48780376-FC85-460A-8725-EC72919AD33D}" type="datetimeFigureOut">
               <a:rPr lang="fr-FR" smtClean="0"/>
-              <a:t>11/07/2024</a:t>
+              <a:t>30/10/2024</a:t>
             </a:fld>
             <a:endParaRPr lang="fr-FR"/>
           </a:p>
@@ -2721,7 +2761,7 @@
           <a:p>
             <a:fld id="{48780376-FC85-460A-8725-EC72919AD33D}" type="datetimeFigureOut">
               <a:rPr lang="fr-FR" smtClean="0"/>
-              <a:t>11/07/2024</a:t>
+              <a:t>30/10/2024</a:t>
             </a:fld>
             <a:endParaRPr lang="fr-FR"/>
           </a:p>
@@ -3009,7 +3049,7 @@
           <a:p>
             <a:fld id="{48780376-FC85-460A-8725-EC72919AD33D}" type="datetimeFigureOut">
               <a:rPr lang="fr-FR" smtClean="0"/>
-              <a:t>11/07/2024</a:t>
+              <a:t>30/10/2024</a:t>
             </a:fld>
             <a:endParaRPr lang="fr-FR"/>
           </a:p>
@@ -3250,7 +3290,7 @@
           <a:p>
             <a:fld id="{48780376-FC85-460A-8725-EC72919AD33D}" type="datetimeFigureOut">
               <a:rPr lang="fr-FR" smtClean="0"/>
-              <a:t>11/07/2024</a:t>
+              <a:t>30/10/2024</a:t>
             </a:fld>
             <a:endParaRPr lang="fr-FR"/>
           </a:p>
@@ -4705,7 +4745,7 @@
                 <a:latin typeface="Courier New" panose="02070309020205020404" pitchFamily="49" charset="0"/>
                 <a:cs typeface="Courier New" panose="02070309020205020404" pitchFamily="49" charset="0"/>
               </a:rPr>
-              <a:t>Topic 1</a:t>
+              <a:t>topic_1</a:t>
             </a:r>
           </a:p>
         </p:txBody>
@@ -4743,7 +4783,7 @@
                 <a:latin typeface="Courier New" panose="02070309020205020404" pitchFamily="49" charset="0"/>
                 <a:cs typeface="Courier New" panose="02070309020205020404" pitchFamily="49" charset="0"/>
               </a:rPr>
-              <a:t>Topic 2</a:t>
+              <a:t>topic_2</a:t>
             </a:r>
           </a:p>
         </p:txBody>
@@ -4956,7 +4996,7 @@
         </p:nvSpPr>
         <p:spPr>
           <a:xfrm>
-            <a:off x="3508188" y="3006165"/>
+            <a:off x="3472153" y="3000068"/>
             <a:ext cx="2134052" cy="1535953"/>
           </a:xfrm>
           <a:prstGeom prst="rect">
@@ -5017,7 +5057,7 @@
         </p:nvSpPr>
         <p:spPr>
           <a:xfrm>
-            <a:off x="8214558" y="3093651"/>
+            <a:off x="8297941" y="3153353"/>
             <a:ext cx="2134052" cy="1535953"/>
           </a:xfrm>
           <a:prstGeom prst="rect">
@@ -5060,7 +5100,7 @@
           <a:lstStyle/>
           <a:p>
             <a:pPr algn="ctr"/>
-            <a:endParaRPr lang="fr-FR"/>
+            <a:endParaRPr lang="fr-FR" dirty="0"/>
           </a:p>
         </p:txBody>
       </p:sp>

</xml_diff>